<commit_message>
Fixes "pathname" typo on several slides.
</commit_message>
<xml_diff>
--- a/ULI101-2.1.pptx
+++ b/ULI101-2.1.pptx
@@ -337,7 +337,7 @@
   <pc:docChgLst>
     <pc:chgData name="Chris Johnson" userId="ff589efc-7bdb-4c2a-ab65-6fce12576f74" providerId="ADAL" clId="{7D59EC0E-2881-C847-976B-9D9F31DB7CBA}"/>
     <pc:docChg chg="custSel modSld">
-      <pc:chgData name="Chris Johnson" userId="ff589efc-7bdb-4c2a-ab65-6fce12576f74" providerId="ADAL" clId="{7D59EC0E-2881-C847-976B-9D9F31DB7CBA}" dt="2022-09-10T18:37:29.648" v="69" actId="20577"/>
+      <pc:chgData name="Chris Johnson" userId="ff589efc-7bdb-4c2a-ab65-6fce12576f74" providerId="ADAL" clId="{7D59EC0E-2881-C847-976B-9D9F31DB7CBA}" dt="2022-09-11T23:35:43.861" v="72" actId="14734"/>
       <pc:docMkLst>
         <pc:docMk/>
       </pc:docMkLst>
@@ -411,6 +411,21 @@
           </ac:picMkLst>
         </pc:picChg>
       </pc:sldChg>
+      <pc:sldChg chg="modSp mod">
+        <pc:chgData name="Chris Johnson" userId="ff589efc-7bdb-4c2a-ab65-6fce12576f74" providerId="ADAL" clId="{7D59EC0E-2881-C847-976B-9D9F31DB7CBA}" dt="2022-09-11T23:35:43.861" v="72" actId="14734"/>
+        <pc:sldMkLst>
+          <pc:docMk/>
+          <pc:sldMk cId="3489722857" sldId="285"/>
+        </pc:sldMkLst>
+        <pc:graphicFrameChg chg="modGraphic">
+          <ac:chgData name="Chris Johnson" userId="ff589efc-7bdb-4c2a-ab65-6fce12576f74" providerId="ADAL" clId="{7D59EC0E-2881-C847-976B-9D9F31DB7CBA}" dt="2022-09-11T23:35:43.861" v="72" actId="14734"/>
+          <ac:graphicFrameMkLst>
+            <pc:docMk/>
+            <pc:sldMk cId="3489722857" sldId="285"/>
+            <ac:graphicFrameMk id="4" creationId="{3D181DCE-7158-754D-8B84-2B46D8EE1D2C}"/>
+          </ac:graphicFrameMkLst>
+        </pc:graphicFrameChg>
+      </pc:sldChg>
       <pc:sldChg chg="modSp">
         <pc:chgData name="Chris Johnson" userId="ff589efc-7bdb-4c2a-ab65-6fce12576f74" providerId="ADAL" clId="{7D59EC0E-2881-C847-976B-9D9F31DB7CBA}" dt="2022-09-10T18:24:06.457" v="40" actId="6549"/>
         <pc:sldMkLst>
@@ -440,6 +455,21 @@
             <ac:spMk id="2" creationId="{1AF487AF-3253-5F42-B599-57667778EABD}"/>
           </ac:spMkLst>
         </pc:spChg>
+      </pc:sldChg>
+      <pc:sldChg chg="modSp mod">
+        <pc:chgData name="Chris Johnson" userId="ff589efc-7bdb-4c2a-ab65-6fce12576f74" providerId="ADAL" clId="{7D59EC0E-2881-C847-976B-9D9F31DB7CBA}" dt="2022-09-11T23:35:19.965" v="70" actId="20577"/>
+        <pc:sldMkLst>
+          <pc:docMk/>
+          <pc:sldMk cId="1789083601" sldId="319"/>
+        </pc:sldMkLst>
+        <pc:graphicFrameChg chg="modGraphic">
+          <ac:chgData name="Chris Johnson" userId="ff589efc-7bdb-4c2a-ab65-6fce12576f74" providerId="ADAL" clId="{7D59EC0E-2881-C847-976B-9D9F31DB7CBA}" dt="2022-09-11T23:35:19.965" v="70" actId="20577"/>
+          <ac:graphicFrameMkLst>
+            <pc:docMk/>
+            <pc:sldMk cId="1789083601" sldId="319"/>
+            <ac:graphicFrameMk id="4" creationId="{3D181DCE-7158-754D-8B84-2B46D8EE1D2C}"/>
+          </ac:graphicFrameMkLst>
+        </pc:graphicFrameChg>
       </pc:sldChg>
       <pc:sldChg chg="modSp modAnim">
         <pc:chgData name="Chris Johnson" userId="ff589efc-7bdb-4c2a-ab65-6fce12576f74" providerId="ADAL" clId="{7D59EC0E-2881-C847-976B-9D9F31DB7CBA}" dt="2022-09-10T18:24:40.877" v="53" actId="6549"/>
@@ -688,7 +718,7 @@
           <a:p>
             <a:fld id="{92107E4A-59D9-C648-BC62-133DA4EC414F}" type="datetimeFigureOut">
               <a:rPr lang="en-US" smtClean="0"/>
-              <a:t>9/10/22</a:t>
+              <a:t>9/11/22</a:t>
             </a:fld>
             <a:endParaRPr lang="en-US"/>
           </a:p>
@@ -1178,7 +1208,7 @@
           <a:p>
             <a:fld id="{4AB1357F-A277-7442-BEE7-4FE250216E54}" type="datetimeFigureOut">
               <a:rPr lang="en-US" smtClean="0"/>
-              <a:t>9/10/22</a:t>
+              <a:t>9/11/22</a:t>
             </a:fld>
             <a:endParaRPr lang="en-US"/>
           </a:p>
@@ -1389,7 +1419,7 @@
           <a:p>
             <a:fld id="{4AB1357F-A277-7442-BEE7-4FE250216E54}" type="datetimeFigureOut">
               <a:rPr lang="en-US" smtClean="0"/>
-              <a:t>9/10/22</a:t>
+              <a:t>9/11/22</a:t>
             </a:fld>
             <a:endParaRPr lang="en-US"/>
           </a:p>
@@ -1604,7 +1634,7 @@
           <a:p>
             <a:fld id="{4AB1357F-A277-7442-BEE7-4FE250216E54}" type="datetimeFigureOut">
               <a:rPr lang="en-US" smtClean="0"/>
-              <a:t>9/10/22</a:t>
+              <a:t>9/11/22</a:t>
             </a:fld>
             <a:endParaRPr lang="en-US"/>
           </a:p>
@@ -1805,7 +1835,7 @@
           <a:p>
             <a:fld id="{4AB1357F-A277-7442-BEE7-4FE250216E54}" type="datetimeFigureOut">
               <a:rPr lang="en-US" smtClean="0"/>
-              <a:t>9/10/22</a:t>
+              <a:t>9/11/22</a:t>
             </a:fld>
             <a:endParaRPr lang="en-US"/>
           </a:p>
@@ -2084,7 +2114,7 @@
           <a:p>
             <a:fld id="{4AB1357F-A277-7442-BEE7-4FE250216E54}" type="datetimeFigureOut">
               <a:rPr lang="en-US" smtClean="0"/>
-              <a:t>9/10/22</a:t>
+              <a:t>9/11/22</a:t>
             </a:fld>
             <a:endParaRPr lang="en-US"/>
           </a:p>
@@ -2352,7 +2382,7 @@
           <a:p>
             <a:fld id="{4AB1357F-A277-7442-BEE7-4FE250216E54}" type="datetimeFigureOut">
               <a:rPr lang="en-US" smtClean="0"/>
-              <a:t>9/10/22</a:t>
+              <a:t>9/11/22</a:t>
             </a:fld>
             <a:endParaRPr lang="en-US"/>
           </a:p>
@@ -2768,7 +2798,7 @@
           <a:p>
             <a:fld id="{4AB1357F-A277-7442-BEE7-4FE250216E54}" type="datetimeFigureOut">
               <a:rPr lang="en-US" smtClean="0"/>
-              <a:t>9/10/22</a:t>
+              <a:t>9/11/22</a:t>
             </a:fld>
             <a:endParaRPr lang="en-US"/>
           </a:p>
@@ -2917,7 +2947,7 @@
           <a:p>
             <a:fld id="{4AB1357F-A277-7442-BEE7-4FE250216E54}" type="datetimeFigureOut">
               <a:rPr lang="en-US" smtClean="0"/>
-              <a:t>9/10/22</a:t>
+              <a:t>9/11/22</a:t>
             </a:fld>
             <a:endParaRPr lang="en-US"/>
           </a:p>
@@ -3043,7 +3073,7 @@
           <a:p>
             <a:fld id="{4AB1357F-A277-7442-BEE7-4FE250216E54}" type="datetimeFigureOut">
               <a:rPr lang="en-US" smtClean="0"/>
-              <a:t>9/10/22</a:t>
+              <a:t>9/11/22</a:t>
             </a:fld>
             <a:endParaRPr lang="en-US"/>
           </a:p>
@@ -3294,7 +3324,7 @@
           <a:p>
             <a:fld id="{4AB1357F-A277-7442-BEE7-4FE250216E54}" type="datetimeFigureOut">
               <a:rPr lang="en-US" smtClean="0"/>
-              <a:t>9/10/22</a:t>
+              <a:t>9/11/22</a:t>
             </a:fld>
             <a:endParaRPr lang="en-US"/>
           </a:p>
@@ -3739,7 +3769,7 @@
           <a:p>
             <a:fld id="{4AB1357F-A277-7442-BEE7-4FE250216E54}" type="datetimeFigureOut">
               <a:rPr lang="en-US" smtClean="0"/>
-              <a:t>9/10/22</a:t>
+              <a:t>9/11/22</a:t>
             </a:fld>
             <a:endParaRPr lang="en-US"/>
           </a:p>
@@ -4066,7 +4096,7 @@
           <a:p>
             <a:fld id="{4AB1357F-A277-7442-BEE7-4FE250216E54}" type="datetimeFigureOut">
               <a:rPr lang="en-US" smtClean="0"/>
-              <a:t>9/10/22</a:t>
+              <a:t>9/11/22</a:t>
             </a:fld>
             <a:endParaRPr lang="en-US"/>
           </a:p>
@@ -9019,7 +9049,7 @@
           <p:nvPr>
             <p:extLst>
               <p:ext uri="{D42A27DB-BD31-4B8C-83A1-F6EECF244321}">
-                <p14:modId xmlns:p14="http://schemas.microsoft.com/office/powerpoint/2010/main" val="366271889"/>
+                <p14:modId xmlns:p14="http://schemas.microsoft.com/office/powerpoint/2010/main" val="1039843170"/>
               </p:ext>
             </p:extLst>
           </p:nvPr>
@@ -9035,14 +9065,14 @@
                 <a:tableStyleId>{93296810-A885-4BE3-A3E7-6D5BEEA58F35}</a:tableStyleId>
               </a:tblPr>
               <a:tblGrid>
-                <a:gridCol w="1808362">
+                <a:gridCol w="1897104">
                   <a:extLst>
                     <a:ext uri="{9D8B030D-6E8A-4147-A177-3AD203B41FA5}">
                       <a16:colId xmlns:a16="http://schemas.microsoft.com/office/drawing/2014/main" val="4249162776"/>
                     </a:ext>
                   </a:extLst>
                 </a:gridCol>
-                <a:gridCol w="4195938">
+                <a:gridCol w="4107196">
                   <a:extLst>
                     <a:ext uri="{9D8B030D-6E8A-4147-A177-3AD203B41FA5}">
                       <a16:colId xmlns:a16="http://schemas.microsoft.com/office/drawing/2014/main" val="3871234389"/>
@@ -9058,13 +9088,8 @@
                     <a:p>
                       <a:r>
                         <a:rPr lang="en-US" sz="1400" dirty="0"/>
-                        <a:t>Directory </a:t>
+                        <a:t>Directory Pathname</a:t>
                       </a:r>
-                      <a:r>
-                        <a:rPr lang="en-US" sz="1400" dirty="0" err="1"/>
-                        <a:t>Pathame</a:t>
-                      </a:r>
-                      <a:endParaRPr lang="en-US" sz="1400" dirty="0"/>
                     </a:p>
                   </a:txBody>
                   <a:tcPr/>
@@ -10498,7 +10523,7 @@
           <p:nvPr>
             <p:extLst>
               <p:ext uri="{D42A27DB-BD31-4B8C-83A1-F6EECF244321}">
-                <p14:modId xmlns:p14="http://schemas.microsoft.com/office/powerpoint/2010/main" val="3660752688"/>
+                <p14:modId xmlns:p14="http://schemas.microsoft.com/office/powerpoint/2010/main" val="1677056678"/>
               </p:ext>
             </p:extLst>
           </p:nvPr>
@@ -10537,13 +10562,8 @@
                     <a:p>
                       <a:r>
                         <a:rPr lang="en-US" dirty="0"/>
-                        <a:t>Directory </a:t>
+                        <a:t>Directory Pathname</a:t>
                       </a:r>
-                      <a:r>
-                        <a:rPr lang="en-US" dirty="0" err="1"/>
-                        <a:t>Pathame</a:t>
-                      </a:r>
-                      <a:endParaRPr lang="en-US" dirty="0"/>
                     </a:p>
                   </a:txBody>
                   <a:tcPr/>

</xml_diff>